<commit_message>
Added time and resolved xml issue
</commit_message>
<xml_diff>
--- a/Resources/template.pptx
+++ b/Resources/template.pptx
@@ -261,7 +261,7 @@
           <a:p>
             <a:fld id="{7ACD2796-6F3F-45C6-8111-C00242282F0D}" type="datetimeFigureOut">
               <a:rPr lang="en-ZA" smtClean="0"/>
-              <a:t>2023/04/20</a:t>
+              <a:t>2023/04/21</a:t>
             </a:fld>
             <a:endParaRPr lang="en-ZA"/>
           </a:p>
@@ -461,7 +461,7 @@
           <a:p>
             <a:fld id="{7ACD2796-6F3F-45C6-8111-C00242282F0D}" type="datetimeFigureOut">
               <a:rPr lang="en-ZA" smtClean="0"/>
-              <a:t>2023/04/20</a:t>
+              <a:t>2023/04/21</a:t>
             </a:fld>
             <a:endParaRPr lang="en-ZA"/>
           </a:p>
@@ -671,7 +671,7 @@
           <a:p>
             <a:fld id="{7ACD2796-6F3F-45C6-8111-C00242282F0D}" type="datetimeFigureOut">
               <a:rPr lang="en-ZA" smtClean="0"/>
-              <a:t>2023/04/20</a:t>
+              <a:t>2023/04/21</a:t>
             </a:fld>
             <a:endParaRPr lang="en-ZA"/>
           </a:p>
@@ -871,7 +871,7 @@
           <a:p>
             <a:fld id="{7ACD2796-6F3F-45C6-8111-C00242282F0D}" type="datetimeFigureOut">
               <a:rPr lang="en-ZA" smtClean="0"/>
-              <a:t>2023/04/20</a:t>
+              <a:t>2023/04/21</a:t>
             </a:fld>
             <a:endParaRPr lang="en-ZA"/>
           </a:p>
@@ -1147,7 +1147,7 @@
           <a:p>
             <a:fld id="{7ACD2796-6F3F-45C6-8111-C00242282F0D}" type="datetimeFigureOut">
               <a:rPr lang="en-ZA" smtClean="0"/>
-              <a:t>2023/04/20</a:t>
+              <a:t>2023/04/21</a:t>
             </a:fld>
             <a:endParaRPr lang="en-ZA"/>
           </a:p>
@@ -1415,7 +1415,7 @@
           <a:p>
             <a:fld id="{7ACD2796-6F3F-45C6-8111-C00242282F0D}" type="datetimeFigureOut">
               <a:rPr lang="en-ZA" smtClean="0"/>
-              <a:t>2023/04/20</a:t>
+              <a:t>2023/04/21</a:t>
             </a:fld>
             <a:endParaRPr lang="en-ZA"/>
           </a:p>
@@ -1830,7 +1830,7 @@
           <a:p>
             <a:fld id="{7ACD2796-6F3F-45C6-8111-C00242282F0D}" type="datetimeFigureOut">
               <a:rPr lang="en-ZA" smtClean="0"/>
-              <a:t>2023/04/20</a:t>
+              <a:t>2023/04/21</a:t>
             </a:fld>
             <a:endParaRPr lang="en-ZA"/>
           </a:p>
@@ -1972,7 +1972,7 @@
           <a:p>
             <a:fld id="{7ACD2796-6F3F-45C6-8111-C00242282F0D}" type="datetimeFigureOut">
               <a:rPr lang="en-ZA" smtClean="0"/>
-              <a:t>2023/04/20</a:t>
+              <a:t>2023/04/21</a:t>
             </a:fld>
             <a:endParaRPr lang="en-ZA"/>
           </a:p>
@@ -2085,7 +2085,7 @@
           <a:p>
             <a:fld id="{7ACD2796-6F3F-45C6-8111-C00242282F0D}" type="datetimeFigureOut">
               <a:rPr lang="en-ZA" smtClean="0"/>
-              <a:t>2023/04/20</a:t>
+              <a:t>2023/04/21</a:t>
             </a:fld>
             <a:endParaRPr lang="en-ZA"/>
           </a:p>
@@ -2398,7 +2398,7 @@
           <a:p>
             <a:fld id="{7ACD2796-6F3F-45C6-8111-C00242282F0D}" type="datetimeFigureOut">
               <a:rPr lang="en-ZA" smtClean="0"/>
-              <a:t>2023/04/20</a:t>
+              <a:t>2023/04/21</a:t>
             </a:fld>
             <a:endParaRPr lang="en-ZA"/>
           </a:p>
@@ -2687,7 +2687,7 @@
           <a:p>
             <a:fld id="{7ACD2796-6F3F-45C6-8111-C00242282F0D}" type="datetimeFigureOut">
               <a:rPr lang="en-ZA" smtClean="0"/>
-              <a:t>2023/04/20</a:t>
+              <a:t>2023/04/21</a:t>
             </a:fld>
             <a:endParaRPr lang="en-ZA"/>
           </a:p>
@@ -2930,7 +2930,7 @@
           <a:p>
             <a:fld id="{7ACD2796-6F3F-45C6-8111-C00242282F0D}" type="datetimeFigureOut">
               <a:rPr lang="en-ZA" smtClean="0"/>
-              <a:t>2023/04/20</a:t>
+              <a:t>2023/04/21</a:t>
             </a:fld>
             <a:endParaRPr lang="en-ZA"/>
           </a:p>
@@ -3406,7 +3406,7 @@
           </a:xfrm>
         </p:spPr>
         <p:txBody>
-          <a:bodyPr>
+          <a:bodyPr wrap="none" anchor="ctr" anchorCtr="0">
             <a:normAutofit/>
           </a:bodyPr>
           <a:lstStyle/>
@@ -3437,6 +3437,18 @@
   <p:clrMapOvr>
     <a:masterClrMapping/>
   </p:clrMapOvr>
+  <mc:AlternateContent xmlns:mc="http://schemas.openxmlformats.org/markup-compatibility/2006">
+    <mc:Choice xmlns:p14="http://schemas.microsoft.com/office/powerpoint/2010/main" Requires="p14">
+      <p:transition p14:dur="250" advTm="25497">
+        <p:pull/>
+      </p:transition>
+    </mc:Choice>
+    <mc:Fallback>
+      <p:transition advTm="25497">
+        <p:pull/>
+      </p:transition>
+    </mc:Fallback>
+  </mc:AlternateContent>
 </p:sld>
 </file>
 

</xml_diff>